<commit_message>
ui changes , assignment checker added
</commit_message>
<xml_diff>
--- a/public/presentation.pptx
+++ b/public/presentation.pptx
@@ -13,11 +13,9 @@
     <p:sldId id="261" r:id="rId7"/>
     <p:sldId id="262" r:id="rId8"/>
     <p:sldId id="263" r:id="rId9"/>
-    <p:sldId id="264" r:id="rId10"/>
-    <p:sldId id="265" r:id="rId11"/>
   </p:sldIdLst>
   <p:notesMasterIdLst>
-    <p:notesMasterId r:id="rId12"/>
+    <p:notesMasterId r:id="rId10"/>
   </p:notesMasterIdLst>
   <p:sldSz cx="9144000" cy="5143500"/>
   <p:notesSz cx="5143500" cy="9144000"/>
@@ -553,94 +551,6 @@
 </p:notes>
 </file>
 
-<file path=ppt/notesSlides/notesSlide10.xml><?xml version="1.0" encoding="utf-8"?>
-<p:notes xmlns:a="http://schemas.openxmlformats.org/drawingml/2006/main" xmlns:r="http://schemas.openxmlformats.org/officeDocument/2006/relationships" xmlns:p="http://schemas.openxmlformats.org/presentationml/2006/main">
-  <p:cSld>
-    <p:spTree>
-      <p:nvGrpSpPr>
-        <p:cNvPr id="1" name=""/>
-        <p:cNvGrpSpPr/>
-        <p:nvPr/>
-      </p:nvGrpSpPr>
-      <p:grpSpPr>
-        <a:xfrm>
-          <a:off x="0" y="0"/>
-          <a:ext cx="0" cy="0"/>
-          <a:chOff x="0" y="0"/>
-          <a:chExt cx="0" cy="0"/>
-        </a:xfrm>
-      </p:grpSpPr>
-      <p:sp>
-        <p:nvSpPr>
-          <p:cNvPr id="2" name="Slide Image Placeholder 1"/>
-          <p:cNvSpPr>
-            <a:spLocks noGrp="1" noRot="1" noChangeAspect="1"/>
-          </p:cNvSpPr>
-          <p:nvPr>
-            <p:ph type="sldImg"/>
-          </p:nvPr>
-        </p:nvSpPr>
-        <p:spPr/>
-      </p:sp>
-      <p:sp>
-        <p:nvSpPr>
-          <p:cNvPr id="3" name="Notes Placeholder 2"/>
-          <p:cNvSpPr>
-            <a:spLocks noGrp="1"/>
-          </p:cNvSpPr>
-          <p:nvPr>
-            <p:ph type="body" idx="1"/>
-          </p:nvPr>
-        </p:nvSpPr>
-        <p:spPr/>
-        <p:txBody>
-          <a:bodyPr/>
-          <a:lstStyle/>
-          <a:p>
-            <a:r>
-              <a:rPr lang="en-US" dirty="0"/>
-              <a:t/>
-            </a:r>
-            <a:endParaRPr lang="en-US" dirty="0"/>
-          </a:p>
-        </p:txBody>
-      </p:sp>
-      <p:sp>
-        <p:nvSpPr>
-          <p:cNvPr id="4" name="Slide Number Placeholder 3"/>
-          <p:cNvSpPr>
-            <a:spLocks noGrp="1"/>
-          </p:cNvSpPr>
-          <p:nvPr>
-            <p:ph type="sldNum" sz="quarter" idx="10"/>
-          </p:nvPr>
-        </p:nvSpPr>
-        <p:spPr/>
-        <p:txBody>
-          <a:bodyPr/>
-          <a:lstStyle/>
-          <a:p>
-            <a:fld id="{F7021451-1387-4CA6-816F-3879F97B5CBC}" type="slidenum">
-              <a:rPr lang="en-US"/>
-              <a:t>10</a:t>
-            </a:fld>
-            <a:endParaRPr lang="en-US"/>
-          </a:p>
-        </p:txBody>
-      </p:sp>
-    </p:spTree>
-    <p:extLst>
-      <p:ext uri="{BB962C8B-B14F-4D97-AF65-F5344CB8AC3E}">
-        <p14:creationId xmlns:p14="http://schemas.microsoft.com/office/powerpoint/2010/main" val="1024086991"/>
-      </p:ext>
-    </p:extLst>
-  </p:cSld>
-  <p:clrMapOvr>
-    <a:masterClrMapping/>
-  </p:clrMapOvr>
-</p:notes>
-</file>
-
 <file path=ppt/notesSlides/notesSlide2.xml><?xml version="1.0" encoding="utf-8"?>
 <p:notes xmlns:a="http://schemas.openxmlformats.org/drawingml/2006/main" xmlns:r="http://schemas.openxmlformats.org/officeDocument/2006/relationships" xmlns:p="http://schemas.openxmlformats.org/presentationml/2006/main">
   <p:cSld>
@@ -1239,94 +1149,6 @@
             <a:fld id="{F7021451-1387-4CA6-816F-3879F97B5CBC}" type="slidenum">
               <a:rPr lang="en-US"/>
               <a:t>8</a:t>
-            </a:fld>
-            <a:endParaRPr lang="en-US"/>
-          </a:p>
-        </p:txBody>
-      </p:sp>
-    </p:spTree>
-    <p:extLst>
-      <p:ext uri="{BB962C8B-B14F-4D97-AF65-F5344CB8AC3E}">
-        <p14:creationId xmlns:p14="http://schemas.microsoft.com/office/powerpoint/2010/main" val="1024086991"/>
-      </p:ext>
-    </p:extLst>
-  </p:cSld>
-  <p:clrMapOvr>
-    <a:masterClrMapping/>
-  </p:clrMapOvr>
-</p:notes>
-</file>
-
-<file path=ppt/notesSlides/notesSlide9.xml><?xml version="1.0" encoding="utf-8"?>
-<p:notes xmlns:a="http://schemas.openxmlformats.org/drawingml/2006/main" xmlns:r="http://schemas.openxmlformats.org/officeDocument/2006/relationships" xmlns:p="http://schemas.openxmlformats.org/presentationml/2006/main">
-  <p:cSld>
-    <p:spTree>
-      <p:nvGrpSpPr>
-        <p:cNvPr id="1" name=""/>
-        <p:cNvGrpSpPr/>
-        <p:nvPr/>
-      </p:nvGrpSpPr>
-      <p:grpSpPr>
-        <a:xfrm>
-          <a:off x="0" y="0"/>
-          <a:ext cx="0" cy="0"/>
-          <a:chOff x="0" y="0"/>
-          <a:chExt cx="0" cy="0"/>
-        </a:xfrm>
-      </p:grpSpPr>
-      <p:sp>
-        <p:nvSpPr>
-          <p:cNvPr id="2" name="Slide Image Placeholder 1"/>
-          <p:cNvSpPr>
-            <a:spLocks noGrp="1" noRot="1" noChangeAspect="1"/>
-          </p:cNvSpPr>
-          <p:nvPr>
-            <p:ph type="sldImg"/>
-          </p:nvPr>
-        </p:nvSpPr>
-        <p:spPr/>
-      </p:sp>
-      <p:sp>
-        <p:nvSpPr>
-          <p:cNvPr id="3" name="Notes Placeholder 2"/>
-          <p:cNvSpPr>
-            <a:spLocks noGrp="1"/>
-          </p:cNvSpPr>
-          <p:nvPr>
-            <p:ph type="body" idx="1"/>
-          </p:nvPr>
-        </p:nvSpPr>
-        <p:spPr/>
-        <p:txBody>
-          <a:bodyPr/>
-          <a:lstStyle/>
-          <a:p>
-            <a:r>
-              <a:rPr lang="en-US" dirty="0"/>
-              <a:t/>
-            </a:r>
-            <a:endParaRPr lang="en-US" dirty="0"/>
-          </a:p>
-        </p:txBody>
-      </p:sp>
-      <p:sp>
-        <p:nvSpPr>
-          <p:cNvPr id="4" name="Slide Number Placeholder 3"/>
-          <p:cNvSpPr>
-            <a:spLocks noGrp="1"/>
-          </p:cNvSpPr>
-          <p:nvPr>
-            <p:ph type="sldNum" sz="quarter" idx="10"/>
-          </p:nvPr>
-        </p:nvSpPr>
-        <p:spPr/>
-        <p:txBody>
-          <a:bodyPr/>
-          <a:lstStyle/>
-          <a:p>
-            <a:fld id="{F7021451-1387-4CA6-816F-3879F97B5CBC}" type="slidenum">
-              <a:rPr lang="en-US"/>
-              <a:t>9</a:t>
             </a:fld>
             <a:endParaRPr lang="en-US"/>
           </a:p>
@@ -1699,7 +1521,7 @@
                   <a:srgbClr val="000000"/>
                 </a:solidFill>
               </a:rPr>
-              <a:t>Introduction to Jenkins</a:t>
+              <a:t>Introduction to the Waterfall Model</a:t>
             </a:r>
             <a:endParaRPr lang="en-US" sz="2800" dirty="0"/>
           </a:p>
@@ -1735,7 +1557,7 @@
                   <a:srgbClr val="000000"/>
                 </a:solidFill>
               </a:rPr>
-              <a:t>• Jenkins is an open-source automation server.</a:t>
+              <a:t>• A sequential, linear software development approach.</a:t>
             </a:r>
             <a:endParaRPr lang="en-US" sz="2000" dirty="0"/>
           </a:p>
@@ -1771,7 +1593,7 @@
                   <a:srgbClr val="000000"/>
                 </a:solidFill>
               </a:rPr>
-              <a:t>• Used for automating tasks related to software development like building, testing, and deploying.</a:t>
+              <a:t>• Each phase must be completed before the next can begin.</a:t>
             </a:r>
             <a:endParaRPr lang="en-US" sz="2000" dirty="0"/>
           </a:p>
@@ -1807,7 +1629,7 @@
                   <a:srgbClr val="000000"/>
                 </a:solidFill>
               </a:rPr>
-              <a:t>• Simplifies Continuous Integration and Continuous Delivery (CI/CD) pipelines.</a:t>
+              <a:t>• Focuses on thorough planning and documentation upfront.</a:t>
             </a:r>
             <a:endParaRPr lang="en-US" sz="2000" dirty="0"/>
           </a:p>
@@ -1843,248 +1665,7 @@
                   <a:srgbClr val="000000"/>
                 </a:solidFill>
               </a:rPr>
-              <a:t>• Automates repetitive tasks, saving time and reducing errors.</a:t>
-            </a:r>
-            <a:endParaRPr lang="en-US" sz="2000" dirty="0"/>
-          </a:p>
-        </p:txBody>
-      </p:sp>
-    </p:spTree>
-  </p:cSld>
-  <p:clrMapOvr>
-    <a:masterClrMapping/>
-  </p:clrMapOvr>
-</p:sld>
-</file>
-
-<file path=ppt/slides/slide10.xml><?xml version="1.0" encoding="utf-8"?>
-<p:sld xmlns:a="http://schemas.openxmlformats.org/drawingml/2006/main" xmlns:r="http://schemas.openxmlformats.org/officeDocument/2006/relationships" xmlns:p="http://schemas.openxmlformats.org/presentationml/2006/main">
-  <p:cSld name="Slide 10">
-    <p:spTree>
-      <p:nvGrpSpPr>
-        <p:cNvPr id="1" name=""/>
-        <p:cNvGrpSpPr/>
-        <p:nvPr/>
-      </p:nvGrpSpPr>
-      <p:grpSpPr>
-        <a:xfrm>
-          <a:off x="0" y="0"/>
-          <a:ext cx="0" cy="0"/>
-          <a:chOff x="0" y="0"/>
-          <a:chExt cx="0" cy="0"/>
-        </a:xfrm>
-      </p:grpSpPr>
-      <p:sp>
-        <p:nvSpPr>
-          <p:cNvPr id="2" name="Text 0"/>
-          <p:cNvSpPr/>
-          <p:nvPr/>
-        </p:nvSpPr>
-        <p:spPr>
-          <a:xfrm>
-            <a:off x="457200" y="457200"/>
-            <a:ext cx="6858000" cy="0"/>
-          </a:xfrm>
-          <a:prstGeom prst="rect">
-            <a:avLst/>
-          </a:prstGeom>
-          <a:noFill/>
-          <a:ln/>
-        </p:spPr>
-        <p:txBody>
-          <a:bodyPr wrap="square" rtlCol="0" anchor="ctr"/>
-          <a:lstStyle/>
-          <a:p>
-            <a:pPr indent="0" marL="0">
-              <a:buNone/>
-            </a:pPr>
-            <a:r>
-              <a:rPr lang="en-US" sz="2800" b="1" dirty="0">
-                <a:solidFill>
-                  <a:srgbClr val="000000"/>
-                </a:solidFill>
-              </a:rPr>
-              <a:t>Benefits of Using Jenkins</a:t>
-            </a:r>
-            <a:endParaRPr lang="en-US" sz="2800" dirty="0"/>
-          </a:p>
-        </p:txBody>
-      </p:sp>
-      <p:sp>
-        <p:nvSpPr>
-          <p:cNvPr id="3" name="Text 1"/>
-          <p:cNvSpPr/>
-          <p:nvPr/>
-        </p:nvSpPr>
-        <p:spPr>
-          <a:xfrm>
-            <a:off x="457200" y="914400"/>
-            <a:ext cx="6858000" cy="0"/>
-          </a:xfrm>
-          <a:prstGeom prst="rect">
-            <a:avLst/>
-          </a:prstGeom>
-          <a:noFill/>
-          <a:ln/>
-        </p:spPr>
-        <p:txBody>
-          <a:bodyPr wrap="square" rtlCol="0" anchor="ctr"/>
-          <a:lstStyle/>
-          <a:p>
-            <a:pPr indent="0" marL="0">
-              <a:buNone/>
-            </a:pPr>
-            <a:r>
-              <a:rPr lang="en-US" sz="2000" dirty="0">
-                <a:solidFill>
-                  <a:srgbClr val="000000"/>
-                </a:solidFill>
-              </a:rPr>
-              <a:t>• Increased development velocity through automation.</a:t>
-            </a:r>
-            <a:endParaRPr lang="en-US" sz="2000" dirty="0"/>
-          </a:p>
-        </p:txBody>
-      </p:sp>
-      <p:sp>
-        <p:nvSpPr>
-          <p:cNvPr id="4" name="Text 2"/>
-          <p:cNvSpPr/>
-          <p:nvPr/>
-        </p:nvSpPr>
-        <p:spPr>
-          <a:xfrm>
-            <a:off x="457200" y="1371600"/>
-            <a:ext cx="6858000" cy="0"/>
-          </a:xfrm>
-          <a:prstGeom prst="rect">
-            <a:avLst/>
-          </a:prstGeom>
-          <a:noFill/>
-          <a:ln/>
-        </p:spPr>
-        <p:txBody>
-          <a:bodyPr wrap="square" rtlCol="0" anchor="ctr"/>
-          <a:lstStyle/>
-          <a:p>
-            <a:pPr indent="0" marL="0">
-              <a:buNone/>
-            </a:pPr>
-            <a:r>
-              <a:rPr lang="en-US" sz="2000" dirty="0">
-                <a:solidFill>
-                  <a:srgbClr val="000000"/>
-                </a:solidFill>
-              </a:rPr>
-              <a:t>• Improved code quality through automated testing.</a:t>
-            </a:r>
-            <a:endParaRPr lang="en-US" sz="2000" dirty="0"/>
-          </a:p>
-        </p:txBody>
-      </p:sp>
-      <p:sp>
-        <p:nvSpPr>
-          <p:cNvPr id="5" name="Text 3"/>
-          <p:cNvSpPr/>
-          <p:nvPr/>
-        </p:nvSpPr>
-        <p:spPr>
-          <a:xfrm>
-            <a:off x="457200" y="1828800"/>
-            <a:ext cx="6858000" cy="0"/>
-          </a:xfrm>
-          <a:prstGeom prst="rect">
-            <a:avLst/>
-          </a:prstGeom>
-          <a:noFill/>
-          <a:ln/>
-        </p:spPr>
-        <p:txBody>
-          <a:bodyPr wrap="square" rtlCol="0" anchor="ctr"/>
-          <a:lstStyle/>
-          <a:p>
-            <a:pPr indent="0" marL="0">
-              <a:buNone/>
-            </a:pPr>
-            <a:r>
-              <a:rPr lang="en-US" sz="2000" dirty="0">
-                <a:solidFill>
-                  <a:srgbClr val="000000"/>
-                </a:solidFill>
-              </a:rPr>
-              <a:t>• Faster feedback cycles for developers.</a:t>
-            </a:r>
-            <a:endParaRPr lang="en-US" sz="2000" dirty="0"/>
-          </a:p>
-        </p:txBody>
-      </p:sp>
-      <p:sp>
-        <p:nvSpPr>
-          <p:cNvPr id="6" name="Text 4"/>
-          <p:cNvSpPr/>
-          <p:nvPr/>
-        </p:nvSpPr>
-        <p:spPr>
-          <a:xfrm>
-            <a:off x="457200" y="2286000"/>
-            <a:ext cx="6858000" cy="0"/>
-          </a:xfrm>
-          <a:prstGeom prst="rect">
-            <a:avLst/>
-          </a:prstGeom>
-          <a:noFill/>
-          <a:ln/>
-        </p:spPr>
-        <p:txBody>
-          <a:bodyPr wrap="square" rtlCol="0" anchor="ctr"/>
-          <a:lstStyle/>
-          <a:p>
-            <a:pPr indent="0" marL="0">
-              <a:buNone/>
-            </a:pPr>
-            <a:r>
-              <a:rPr lang="en-US" sz="2000" dirty="0">
-                <a:solidFill>
-                  <a:srgbClr val="000000"/>
-                </a:solidFill>
-              </a:rPr>
-              <a:t>• Reduced manual effort and errors.</a:t>
-            </a:r>
-            <a:endParaRPr lang="en-US" sz="2000" dirty="0"/>
-          </a:p>
-        </p:txBody>
-      </p:sp>
-      <p:sp>
-        <p:nvSpPr>
-          <p:cNvPr id="7" name="Text 5"/>
-          <p:cNvSpPr/>
-          <p:nvPr/>
-        </p:nvSpPr>
-        <p:spPr>
-          <a:xfrm>
-            <a:off x="457200" y="2743200"/>
-            <a:ext cx="6858000" cy="0"/>
-          </a:xfrm>
-          <a:prstGeom prst="rect">
-            <a:avLst/>
-          </a:prstGeom>
-          <a:noFill/>
-          <a:ln/>
-        </p:spPr>
-        <p:txBody>
-          <a:bodyPr wrap="square" rtlCol="0" anchor="ctr"/>
-          <a:lstStyle/>
-          <a:p>
-            <a:pPr indent="0" marL="0">
-              <a:buNone/>
-            </a:pPr>
-            <a:r>
-              <a:rPr lang="en-US" sz="2000" dirty="0">
-                <a:solidFill>
-                  <a:srgbClr val="000000"/>
-                </a:solidFill>
-              </a:rPr>
-              <a:t>• Streamlined software delivery process.</a:t>
+              <a:t>• Also called a "Linear Sequential Life Cycle Model".</a:t>
             </a:r>
             <a:endParaRPr lang="en-US" sz="2000" dirty="0"/>
           </a:p>
@@ -2145,7 +1726,7 @@
                   <a:srgbClr val="000000"/>
                 </a:solidFill>
               </a:rPr>
-              <a:t>Key Features of Jenkins</a:t>
+              <a:t>The Waterfall Model Phases</a:t>
             </a:r>
             <a:endParaRPr lang="en-US" sz="2800" dirty="0"/>
           </a:p>
@@ -2181,7 +1762,7 @@
                   <a:srgbClr val="000000"/>
                 </a:solidFill>
               </a:rPr>
-              <a:t>• Continuous Integration: Automatically triggers builds and tests when code changes are made.</a:t>
+              <a:t>• **Requirements:** Define project goals and constraints.</a:t>
             </a:r>
             <a:endParaRPr lang="en-US" sz="2000" dirty="0"/>
           </a:p>
@@ -2217,7 +1798,7 @@
                   <a:srgbClr val="000000"/>
                 </a:solidFill>
               </a:rPr>
-              <a:t>• Extensible: Supports thousands of plugins to integrate with various tools.</a:t>
+              <a:t>• **Design:** Plan the architecture and system specifications.</a:t>
             </a:r>
             <a:endParaRPr lang="en-US" sz="2000" dirty="0"/>
           </a:p>
@@ -2253,7 +1834,7 @@
                   <a:srgbClr val="000000"/>
                 </a:solidFill>
               </a:rPr>
-              <a:t>• Distributed Builds: Distributes build workload across multiple machines (nodes).</a:t>
+              <a:t>• **Implementation:** Code and build the system based on the design.</a:t>
             </a:r>
             <a:endParaRPr lang="en-US" sz="2000" dirty="0"/>
           </a:p>
@@ -2289,7 +1870,79 @@
                   <a:srgbClr val="000000"/>
                 </a:solidFill>
               </a:rPr>
-              <a:t>• Easy to Use: User-friendly web interface for managing jobs.</a:t>
+              <a:t>• **Testing:** Verify and validate the system meets requirements.</a:t>
+            </a:r>
+            <a:endParaRPr lang="en-US" sz="2000" dirty="0"/>
+          </a:p>
+        </p:txBody>
+      </p:sp>
+      <p:sp>
+        <p:nvSpPr>
+          <p:cNvPr id="7" name="Text 5"/>
+          <p:cNvSpPr/>
+          <p:nvPr/>
+        </p:nvSpPr>
+        <p:spPr>
+          <a:xfrm>
+            <a:off x="457200" y="2743200"/>
+            <a:ext cx="6858000" cy="0"/>
+          </a:xfrm>
+          <a:prstGeom prst="rect">
+            <a:avLst/>
+          </a:prstGeom>
+          <a:noFill/>
+          <a:ln/>
+        </p:spPr>
+        <p:txBody>
+          <a:bodyPr wrap="square" rtlCol="0" anchor="ctr"/>
+          <a:lstStyle/>
+          <a:p>
+            <a:pPr indent="0" marL="0">
+              <a:buNone/>
+            </a:pPr>
+            <a:r>
+              <a:rPr lang="en-US" sz="2000" dirty="0">
+                <a:solidFill>
+                  <a:srgbClr val="000000"/>
+                </a:solidFill>
+              </a:rPr>
+              <a:t>• **Deployment:** Release the system to the users.</a:t>
+            </a:r>
+            <a:endParaRPr lang="en-US" sz="2000" dirty="0"/>
+          </a:p>
+        </p:txBody>
+      </p:sp>
+      <p:sp>
+        <p:nvSpPr>
+          <p:cNvPr id="8" name="Text 6"/>
+          <p:cNvSpPr/>
+          <p:nvPr/>
+        </p:nvSpPr>
+        <p:spPr>
+          <a:xfrm>
+            <a:off x="457200" y="3200400"/>
+            <a:ext cx="6858000" cy="0"/>
+          </a:xfrm>
+          <a:prstGeom prst="rect">
+            <a:avLst/>
+          </a:prstGeom>
+          <a:noFill/>
+          <a:ln/>
+        </p:spPr>
+        <p:txBody>
+          <a:bodyPr wrap="square" rtlCol="0" anchor="ctr"/>
+          <a:lstStyle/>
+          <a:p>
+            <a:pPr indent="0" marL="0">
+              <a:buNone/>
+            </a:pPr>
+            <a:r>
+              <a:rPr lang="en-US" sz="2000" dirty="0">
+                <a:solidFill>
+                  <a:srgbClr val="000000"/>
+                </a:solidFill>
+              </a:rPr>
+              <a:t>• **Maintenance:** Fix bugs and improve the system.</a:t>
             </a:r>
             <a:endParaRPr lang="en-US" sz="2000" dirty="0"/>
           </a:p>
@@ -2350,7 +2003,7 @@
                   <a:srgbClr val="000000"/>
                 </a:solidFill>
               </a:rPr>
-              <a:t>Jenkins Architecture</a:t>
+              <a:t>Requirements Phase</a:t>
             </a:r>
             <a:endParaRPr lang="en-US" sz="2800" dirty="0"/>
           </a:p>
@@ -2386,7 +2039,7 @@
                   <a:srgbClr val="000000"/>
                 </a:solidFill>
               </a:rPr>
-              <a:t>• **Jenkins Master:** The central controller, manages nodes, schedules jobs, and presents the UI.</a:t>
+              <a:t>• A detailed definition of system functionality.</a:t>
             </a:r>
             <a:endParaRPr lang="en-US" sz="2000" dirty="0"/>
           </a:p>
@@ -2422,7 +2075,7 @@
                   <a:srgbClr val="000000"/>
                 </a:solidFill>
               </a:rPr>
-              <a:t>• **Jenkins Nodes (Agents):** Execute build jobs delegated by the Master.</a:t>
+              <a:t>• Output is a comprehensive requirements document.</a:t>
             </a:r>
             <a:endParaRPr lang="en-US" sz="2000" dirty="0"/>
           </a:p>
@@ -2458,7 +2111,7 @@
                   <a:srgbClr val="000000"/>
                 </a:solidFill>
               </a:rPr>
-              <a:t>• **Plugins:** Extend Jenkins functionality.</a:t>
+              <a:t>• Key questions: What is the system supposed to do? What problem does it solve?</a:t>
             </a:r>
             <a:endParaRPr lang="en-US" sz="2000" dirty="0"/>
           </a:p>
@@ -2494,7 +2147,7 @@
                   <a:srgbClr val="000000"/>
                 </a:solidFill>
               </a:rPr>
-              <a:t>• Communication between master and nodes is via TCP/IP protocol.</a:t>
+              <a:t>• User stories can play an important part here.</a:t>
             </a:r>
             <a:endParaRPr lang="en-US" sz="2000" dirty="0"/>
           </a:p>
@@ -2555,7 +2208,7 @@
                   <a:srgbClr val="000000"/>
                 </a:solidFill>
               </a:rPr>
-              <a:t>Continuous Integration with Jenkins</a:t>
+              <a:t>Design Phase</a:t>
             </a:r>
             <a:endParaRPr lang="en-US" sz="2800" dirty="0"/>
           </a:p>
@@ -2591,7 +2244,7 @@
                   <a:srgbClr val="000000"/>
                 </a:solidFill>
               </a:rPr>
-              <a:t>• Monitors the version control system (e.g., Git) for changes.</a:t>
+              <a:t>• Transforms requirements into a detailed design.</a:t>
             </a:r>
             <a:endParaRPr lang="en-US" sz="2000" dirty="0"/>
           </a:p>
@@ -2627,7 +2280,7 @@
                   <a:srgbClr val="000000"/>
                 </a:solidFill>
               </a:rPr>
-              <a:t>• Automatically builds and tests code upon commit.</a:t>
+              <a:t>• Defines system architecture, data structures, and algorithms.</a:t>
             </a:r>
             <a:endParaRPr lang="en-US" sz="2000" dirty="0"/>
           </a:p>
@@ -2663,7 +2316,7 @@
                   <a:srgbClr val="000000"/>
                 </a:solidFill>
               </a:rPr>
-              <a:t>• Provides feedback to developers on build status.</a:t>
+              <a:t>• Outputs include design documents and specifications.</a:t>
             </a:r>
             <a:endParaRPr lang="en-US" sz="2000" dirty="0"/>
           </a:p>
@@ -2699,7 +2352,7 @@
                   <a:srgbClr val="000000"/>
                 </a:solidFill>
               </a:rPr>
-              <a:t>• Helps identify and fix integration issues early.</a:t>
+              <a:t>• Covers both high-level and low-level design details.</a:t>
             </a:r>
             <a:endParaRPr lang="en-US" sz="2000" dirty="0"/>
           </a:p>
@@ -2760,7 +2413,7 @@
                   <a:srgbClr val="000000"/>
                 </a:solidFill>
               </a:rPr>
-              <a:t>Continuous Delivery with Jenkins</a:t>
+              <a:t>Implementation Phase</a:t>
             </a:r>
             <a:endParaRPr lang="en-US" sz="2800" dirty="0"/>
           </a:p>
@@ -2796,7 +2449,7 @@
                   <a:srgbClr val="000000"/>
                 </a:solidFill>
               </a:rPr>
-              <a:t>• Extends CI to automatically deploy applications to various environments.</a:t>
+              <a:t>• Translates the design into executable code.</a:t>
             </a:r>
             <a:endParaRPr lang="en-US" sz="2000" dirty="0"/>
           </a:p>
@@ -2832,7 +2485,7 @@
                   <a:srgbClr val="000000"/>
                 </a:solidFill>
               </a:rPr>
-              <a:t>• Automates the release process, reducing manual effort.</a:t>
+              <a:t>• Coding is the primary activity in this phase.</a:t>
             </a:r>
             <a:endParaRPr lang="en-US" sz="2000" dirty="0"/>
           </a:p>
@@ -2868,7 +2521,7 @@
                   <a:srgbClr val="000000"/>
                 </a:solidFill>
               </a:rPr>
-              <a:t>• Ensures consistent and repeatable deployments.</a:t>
+              <a:t>• Unit testing is often performed during implementation.</a:t>
             </a:r>
             <a:endParaRPr lang="en-US" sz="2000" dirty="0"/>
           </a:p>
@@ -2904,7 +2557,7 @@
                   <a:srgbClr val="000000"/>
                 </a:solidFill>
               </a:rPr>
-              <a:t>• Supports various deployment strategies (e.g., Blue/Green, Canary).</a:t>
+              <a:t>• Requires adherence to coding standards.</a:t>
             </a:r>
             <a:endParaRPr lang="en-US" sz="2000" dirty="0"/>
           </a:p>
@@ -2965,7 +2618,7 @@
                   <a:srgbClr val="000000"/>
                 </a:solidFill>
               </a:rPr>
-              <a:t>Setting Up Jenkins</a:t>
+              <a:t>Testing Phase</a:t>
             </a:r>
             <a:endParaRPr lang="en-US" sz="2800" dirty="0"/>
           </a:p>
@@ -3001,7 +2654,7 @@
                   <a:srgbClr val="000000"/>
                 </a:solidFill>
               </a:rPr>
-              <a:t>• Download the Jenkins package suitable for your OS from the official Jenkins website.</a:t>
+              <a:t>• Evaluates the system against the requirements.</a:t>
             </a:r>
             <a:endParaRPr lang="en-US" sz="2000" dirty="0"/>
           </a:p>
@@ -3037,7 +2690,7 @@
                   <a:srgbClr val="000000"/>
                 </a:solidFill>
               </a:rPr>
-              <a:t>• Install Jenkins using the provided installer or package manager.</a:t>
+              <a:t>• Detects and fixes defects in the software.</a:t>
             </a:r>
             <a:endParaRPr lang="en-US" sz="2000" dirty="0"/>
           </a:p>
@@ -3073,7 +2726,7 @@
                   <a:srgbClr val="000000"/>
                 </a:solidFill>
               </a:rPr>
-              <a:t>• Access Jenkins through a web browser (default port is 8080).</a:t>
+              <a:t>• Various testing methods employed (unit, integration, system).</a:t>
             </a:r>
             <a:endParaRPr lang="en-US" sz="2000" dirty="0"/>
           </a:p>
@@ -3109,7 +2762,7 @@
                   <a:srgbClr val="000000"/>
                 </a:solidFill>
               </a:rPr>
-              <a:t>• Follow the setup wizard to configure initial settings and install plugins.</a:t>
+              <a:t>• Produces test reports and bug tracking information.</a:t>
             </a:r>
             <a:endParaRPr lang="en-US" sz="2000" dirty="0"/>
           </a:p>
@@ -3170,7 +2823,7 @@
                   <a:srgbClr val="000000"/>
                 </a:solidFill>
               </a:rPr>
-              <a:t>Creating a Jenkins Job</a:t>
+              <a:t>Advantages of the Waterfall Model</a:t>
             </a:r>
             <a:endParaRPr lang="en-US" sz="2800" dirty="0"/>
           </a:p>
@@ -3206,7 +2859,7 @@
                   <a:srgbClr val="000000"/>
                 </a:solidFill>
               </a:rPr>
-              <a:t>• Log in to the Jenkins web interface.</a:t>
+              <a:t>• Simple and easy to understand and implement.</a:t>
             </a:r>
             <a:endParaRPr lang="en-US" sz="2000" dirty="0"/>
           </a:p>
@@ -3242,7 +2895,7 @@
                   <a:srgbClr val="000000"/>
                 </a:solidFill>
               </a:rPr>
-              <a:t>• Click "New Item" to create a new job.</a:t>
+              <a:t>• Well-suited for projects with clear, stable requirements.</a:t>
             </a:r>
             <a:endParaRPr lang="en-US" sz="2000" dirty="0"/>
           </a:p>
@@ -3278,7 +2931,7 @@
                   <a:srgbClr val="000000"/>
                 </a:solidFill>
               </a:rPr>
-              <a:t>• Choose a job type (e.g., Freestyle project, Pipeline).</a:t>
+              <a:t>• Disciplined approach with defined stages and milestones.</a:t>
             </a:r>
             <a:endParaRPr lang="en-US" sz="2000" dirty="0"/>
           </a:p>
@@ -3314,7 +2967,7 @@
                   <a:srgbClr val="000000"/>
                 </a:solidFill>
               </a:rPr>
-              <a:t>• Configure the job settings, including source code management, build triggers, and build steps.</a:t>
+              <a:t>• Easy to manage due to the rigidity of the model.</a:t>
             </a:r>
             <a:endParaRPr lang="en-US" sz="2000" dirty="0"/>
           </a:p>
@@ -3375,7 +3028,7 @@
                   <a:srgbClr val="000000"/>
                 </a:solidFill>
               </a:rPr>
-              <a:t>Jenkins Plugins</a:t>
+              <a:t>Disadvantages of the Waterfall Model</a:t>
             </a:r>
             <a:endParaRPr lang="en-US" sz="2800" dirty="0"/>
           </a:p>
@@ -3411,7 +3064,7 @@
                   <a:srgbClr val="000000"/>
                 </a:solidFill>
               </a:rPr>
-              <a:t>• Plugins extend Jenkins functionality to integrate with various tools and technologies.</a:t>
+              <a:t>• Inflexible to changes once a phase is complete.</a:t>
             </a:r>
             <a:endParaRPr lang="en-US" sz="2000" dirty="0"/>
           </a:p>
@@ -3447,7 +3100,7 @@
                   <a:srgbClr val="000000"/>
                 </a:solidFill>
               </a:rPr>
-              <a:t>• Examples: Git plugin, Maven Integration plugin, Docker plugin, SonarQube plugin.</a:t>
+              <a:t>• Difficult to accommodate evolving requirements.</a:t>
             </a:r>
             <a:endParaRPr lang="en-US" sz="2000" dirty="0"/>
           </a:p>
@@ -3483,7 +3136,7 @@
                   <a:srgbClr val="000000"/>
                 </a:solidFill>
               </a:rPr>
-              <a:t>• Install plugins through the Jenkins Plugin Manager.</a:t>
+              <a:t>• Working software is only produced late in the lifecycle.</a:t>
             </a:r>
             <a:endParaRPr lang="en-US" sz="2000" dirty="0"/>
           </a:p>
@@ -3519,82 +3172,21 @@
                   <a:srgbClr val="000000"/>
                 </a:solidFill>
               </a:rPr>
-              <a:t>• Plugins make Jenkins extremely versatile.</a:t>
+              <a:t>• High risk and uncertainty if requirements are not fully understood upfront.</a:t>
             </a:r>
             <a:endParaRPr lang="en-US" sz="2000" dirty="0"/>
           </a:p>
         </p:txBody>
       </p:sp>
-    </p:spTree>
-  </p:cSld>
-  <p:clrMapOvr>
-    <a:masterClrMapping/>
-  </p:clrMapOvr>
-</p:sld>
-</file>
-
-<file path=ppt/slides/slide9.xml><?xml version="1.0" encoding="utf-8"?>
-<p:sld xmlns:a="http://schemas.openxmlformats.org/drawingml/2006/main" xmlns:r="http://schemas.openxmlformats.org/officeDocument/2006/relationships" xmlns:p="http://schemas.openxmlformats.org/presentationml/2006/main">
-  <p:cSld name="Slide 9">
-    <p:spTree>
-      <p:nvGrpSpPr>
-        <p:cNvPr id="1" name=""/>
-        <p:cNvGrpSpPr/>
-        <p:nvPr/>
-      </p:nvGrpSpPr>
-      <p:grpSpPr>
-        <a:xfrm>
-          <a:off x="0" y="0"/>
-          <a:ext cx="0" cy="0"/>
-          <a:chOff x="0" y="0"/>
-          <a:chExt cx="0" cy="0"/>
-        </a:xfrm>
-      </p:grpSpPr>
-      <p:sp>
-        <p:nvSpPr>
-          <p:cNvPr id="2" name="Text 0"/>
-          <p:cNvSpPr/>
-          <p:nvPr/>
-        </p:nvSpPr>
-        <p:spPr>
-          <a:xfrm>
-            <a:off x="457200" y="457200"/>
-            <a:ext cx="6858000" cy="0"/>
-          </a:xfrm>
-          <a:prstGeom prst="rect">
-            <a:avLst/>
-          </a:prstGeom>
-          <a:noFill/>
-          <a:ln/>
-        </p:spPr>
-        <p:txBody>
-          <a:bodyPr wrap="square" rtlCol="0" anchor="ctr"/>
-          <a:lstStyle/>
-          <a:p>
-            <a:pPr indent="0" marL="0">
-              <a:buNone/>
-            </a:pPr>
-            <a:r>
-              <a:rPr lang="en-US" sz="2800" b="1" dirty="0">
-                <a:solidFill>
-                  <a:srgbClr val="000000"/>
-                </a:solidFill>
-              </a:rPr>
-              <a:t>Jenkins Pipeline as Code</a:t>
-            </a:r>
-            <a:endParaRPr lang="en-US" sz="2800" dirty="0"/>
-          </a:p>
-        </p:txBody>
-      </p:sp>
-      <p:sp>
-        <p:nvSpPr>
-          <p:cNvPr id="3" name="Text 1"/>
-          <p:cNvSpPr/>
-          <p:nvPr/>
-        </p:nvSpPr>
-        <p:spPr>
-          <a:xfrm>
-            <a:off x="457200" y="914400"/>
+      <p:sp>
+        <p:nvSpPr>
+          <p:cNvPr id="7" name="Text 5"/>
+          <p:cNvSpPr/>
+          <p:nvPr/>
+        </p:nvSpPr>
+        <p:spPr>
+          <a:xfrm>
+            <a:off x="457200" y="2743200"/>
             <a:ext cx="6858000" cy="0"/>
           </a:xfrm>
           <a:prstGeom prst="rect">
@@ -3616,115 +3208,7 @@
                   <a:srgbClr val="000000"/>
                 </a:solidFill>
               </a:rPr>
-              <a:t>• Define CI/CD pipelines using a Groovy-based DSL (Domain Specific Language).</a:t>
-            </a:r>
-            <a:endParaRPr lang="en-US" sz="2000" dirty="0"/>
-          </a:p>
-        </p:txBody>
-      </p:sp>
-      <p:sp>
-        <p:nvSpPr>
-          <p:cNvPr id="4" name="Text 2"/>
-          <p:cNvSpPr/>
-          <p:nvPr/>
-        </p:nvSpPr>
-        <p:spPr>
-          <a:xfrm>
-            <a:off x="457200" y="1371600"/>
-            <a:ext cx="6858000" cy="0"/>
-          </a:xfrm>
-          <a:prstGeom prst="rect">
-            <a:avLst/>
-          </a:prstGeom>
-          <a:noFill/>
-          <a:ln/>
-        </p:spPr>
-        <p:txBody>
-          <a:bodyPr wrap="square" rtlCol="0" anchor="ctr"/>
-          <a:lstStyle/>
-          <a:p>
-            <a:pPr indent="0" marL="0">
-              <a:buNone/>
-            </a:pPr>
-            <a:r>
-              <a:rPr lang="en-US" sz="2000" dirty="0">
-                <a:solidFill>
-                  <a:srgbClr val="000000"/>
-                </a:solidFill>
-              </a:rPr>
-              <a:t>• Pipeline definitions can be stored in version control alongside application code.</a:t>
-            </a:r>
-            <a:endParaRPr lang="en-US" sz="2000" dirty="0"/>
-          </a:p>
-        </p:txBody>
-      </p:sp>
-      <p:sp>
-        <p:nvSpPr>
-          <p:cNvPr id="5" name="Text 3"/>
-          <p:cNvSpPr/>
-          <p:nvPr/>
-        </p:nvSpPr>
-        <p:spPr>
-          <a:xfrm>
-            <a:off x="457200" y="1828800"/>
-            <a:ext cx="6858000" cy="0"/>
-          </a:xfrm>
-          <a:prstGeom prst="rect">
-            <a:avLst/>
-          </a:prstGeom>
-          <a:noFill/>
-          <a:ln/>
-        </p:spPr>
-        <p:txBody>
-          <a:bodyPr wrap="square" rtlCol="0" anchor="ctr"/>
-          <a:lstStyle/>
-          <a:p>
-            <a:pPr indent="0" marL="0">
-              <a:buNone/>
-            </a:pPr>
-            <a:r>
-              <a:rPr lang="en-US" sz="2000" dirty="0">
-                <a:solidFill>
-                  <a:srgbClr val="000000"/>
-                </a:solidFill>
-              </a:rPr>
-              <a:t>• Improves collaboration and maintainability.</a:t>
-            </a:r>
-            <a:endParaRPr lang="en-US" sz="2000" dirty="0"/>
-          </a:p>
-        </p:txBody>
-      </p:sp>
-      <p:sp>
-        <p:nvSpPr>
-          <p:cNvPr id="6" name="Text 4"/>
-          <p:cNvSpPr/>
-          <p:nvPr/>
-        </p:nvSpPr>
-        <p:spPr>
-          <a:xfrm>
-            <a:off x="457200" y="2286000"/>
-            <a:ext cx="6858000" cy="0"/>
-          </a:xfrm>
-          <a:prstGeom prst="rect">
-            <a:avLst/>
-          </a:prstGeom>
-          <a:noFill/>
-          <a:ln/>
-        </p:spPr>
-        <p:txBody>
-          <a:bodyPr wrap="square" rtlCol="0" anchor="ctr"/>
-          <a:lstStyle/>
-          <a:p>
-            <a:pPr indent="0" marL="0">
-              <a:buNone/>
-            </a:pPr>
-            <a:r>
-              <a:rPr lang="en-US" sz="2000" dirty="0">
-                <a:solidFill>
-                  <a:srgbClr val="000000"/>
-                </a:solidFill>
-              </a:rPr>
-              <a:t>• Allows for complex workflows and conditional logic.</a:t>
+              <a:t>• Not a good model for complex or object-oriented projects.</a:t>
             </a:r>
             <a:endParaRPr lang="en-US" sz="2000" dirty="0"/>
           </a:p>

</xml_diff>